<commit_message>
Versión corregida final TP3
</commit_message>
<xml_diff>
--- a/TP3/Trabajo Práctico Nro. 3 Análisis Numérico.pptx
+++ b/TP3/Trabajo Práctico Nro. 3 Análisis Numérico.pptx
@@ -144,75 +144,6 @@
 </p:presentation>
 </file>
 
-<file path=ppt/revisionInfo.xml><?xml version="1.0" encoding="utf-8"?>
-<p1510:revInfo xmlns:a="http://schemas.openxmlformats.org/drawingml/2006/main" xmlns:r="http://schemas.openxmlformats.org/officeDocument/2006/relationships" xmlns:p1510="http://schemas.microsoft.com/office/powerpoint/2015/10/main">
-  <p1510:revLst>
-    <p1510:client id="{660E785E-F2BE-4A48-B2A8-D8375AE425E4}" v="1" dt="2025-06-27T18:26:38.169"/>
-  </p1510:revLst>
-</p1510:revInfo>
-</file>
-
-<file path=ppt/changesInfos/changesInfo1.xml><?xml version="1.0" encoding="utf-8"?>
-<pc:chgInfo xmlns:a="http://schemas.openxmlformats.org/drawingml/2006/main" xmlns:r="http://schemas.openxmlformats.org/officeDocument/2006/relationships" xmlns:ac="http://schemas.microsoft.com/office/drawing/2013/main/command" xmlns:pc="http://schemas.microsoft.com/office/powerpoint/2013/main/command">
-  <pc:docChgLst>
-    <pc:chgData name="Diego Fernando Danelone" userId="b117111b-3349-45a5-a677-5c0bcacb5039" providerId="ADAL" clId="{660E785E-F2BE-4A48-B2A8-D8375AE425E4}"/>
-    <pc:docChg chg="undo custSel modSld">
-      <pc:chgData name="Diego Fernando Danelone" userId="b117111b-3349-45a5-a677-5c0bcacb5039" providerId="ADAL" clId="{660E785E-F2BE-4A48-B2A8-D8375AE425E4}" dt="2025-06-27T18:28:09.892" v="28" actId="1076"/>
-      <pc:docMkLst>
-        <pc:docMk/>
-      </pc:docMkLst>
-      <pc:sldChg chg="addSp modSp mod">
-        <pc:chgData name="Diego Fernando Danelone" userId="b117111b-3349-45a5-a677-5c0bcacb5039" providerId="ADAL" clId="{660E785E-F2BE-4A48-B2A8-D8375AE425E4}" dt="2025-06-27T18:28:09.892" v="28" actId="1076"/>
-        <pc:sldMkLst>
-          <pc:docMk/>
-          <pc:sldMk cId="0" sldId="262"/>
-        </pc:sldMkLst>
-        <pc:spChg chg="mod">
-          <ac:chgData name="Diego Fernando Danelone" userId="b117111b-3349-45a5-a677-5c0bcacb5039" providerId="ADAL" clId="{660E785E-F2BE-4A48-B2A8-D8375AE425E4}" dt="2025-06-27T18:27:20.158" v="22" actId="113"/>
-          <ac:spMkLst>
-            <pc:docMk/>
-            <pc:sldMk cId="0" sldId="262"/>
-            <ac:spMk id="2" creationId="{00000000-0000-0000-0000-000000000000}"/>
-          </ac:spMkLst>
-        </pc:spChg>
-        <pc:spChg chg="mod">
-          <ac:chgData name="Diego Fernando Danelone" userId="b117111b-3349-45a5-a677-5c0bcacb5039" providerId="ADAL" clId="{660E785E-F2BE-4A48-B2A8-D8375AE425E4}" dt="2025-06-27T18:28:09.892" v="28" actId="1076"/>
-          <ac:spMkLst>
-            <pc:docMk/>
-            <pc:sldMk cId="0" sldId="262"/>
-            <ac:spMk id="3" creationId="{00000000-0000-0000-0000-000000000000}"/>
-          </ac:spMkLst>
-        </pc:spChg>
-        <pc:spChg chg="mod">
-          <ac:chgData name="Diego Fernando Danelone" userId="b117111b-3349-45a5-a677-5c0bcacb5039" providerId="ADAL" clId="{660E785E-F2BE-4A48-B2A8-D8375AE425E4}" dt="2025-06-27T18:27:40.320" v="24" actId="1076"/>
-          <ac:spMkLst>
-            <pc:docMk/>
-            <pc:sldMk cId="0" sldId="262"/>
-            <ac:spMk id="4" creationId="{00000000-0000-0000-0000-000000000000}"/>
-          </ac:spMkLst>
-        </pc:spChg>
-        <pc:spChg chg="mod">
-          <ac:chgData name="Diego Fernando Danelone" userId="b117111b-3349-45a5-a677-5c0bcacb5039" providerId="ADAL" clId="{660E785E-F2BE-4A48-B2A8-D8375AE425E4}" dt="2025-06-27T18:27:45.324" v="26" actId="14100"/>
-          <ac:spMkLst>
-            <pc:docMk/>
-            <pc:sldMk cId="0" sldId="262"/>
-            <ac:spMk id="5" creationId="{00000000-0000-0000-0000-000000000000}"/>
-          </ac:spMkLst>
-        </pc:spChg>
-        <pc:picChg chg="add mod">
-          <ac:chgData name="Diego Fernando Danelone" userId="b117111b-3349-45a5-a677-5c0bcacb5039" providerId="ADAL" clId="{660E785E-F2BE-4A48-B2A8-D8375AE425E4}" dt="2025-06-27T18:27:17.568" v="21" actId="1076"/>
-          <ac:picMkLst>
-            <pc:docMk/>
-            <pc:sldMk cId="0" sldId="262"/>
-            <ac:picMk id="6" creationId="{DBB9A16D-5E32-89BF-1D63-74080D9D2C2C}"/>
-          </ac:picMkLst>
-        </pc:picChg>
-      </pc:sldChg>
-    </pc:docChg>
-  </pc:docChgLst>
-</pc:chgInfo>
-</file>
-
 <file path=ppt/slideLayouts/slideLayout1.xml><?xml version="1.0" encoding="utf-8"?>
 <p:sldLayout xmlns:a="http://schemas.openxmlformats.org/drawingml/2006/main" xmlns:r="http://schemas.openxmlformats.org/officeDocument/2006/relationships" xmlns:p="http://schemas.openxmlformats.org/presentationml/2006/main" type="title" preserve="1">
   <p:cSld name="Title Slide">
@@ -393,7 +324,7 @@
             <a:fld id="{1D8BD707-D9CF-40AE-B4C6-C98DA3205C09}" type="datetimeFigureOut">
               <a:rPr lang="en-US" smtClean="0"/>
               <a:pPr/>
-              <a:t>6/27/2025</a:t>
+              <a:t>6/30/2025</a:t>
             </a:fld>
             <a:endParaRPr lang="en-US"/>
           </a:p>
@@ -558,7 +489,7 @@
             <a:fld id="{1D8BD707-D9CF-40AE-B4C6-C98DA3205C09}" type="datetimeFigureOut">
               <a:rPr lang="en-US" smtClean="0"/>
               <a:pPr/>
-              <a:t>6/27/2025</a:t>
+              <a:t>6/30/2025</a:t>
             </a:fld>
             <a:endParaRPr lang="en-US"/>
           </a:p>
@@ -733,7 +664,7 @@
             <a:fld id="{1D8BD707-D9CF-40AE-B4C6-C98DA3205C09}" type="datetimeFigureOut">
               <a:rPr lang="en-US" smtClean="0"/>
               <a:pPr/>
-              <a:t>6/27/2025</a:t>
+              <a:t>6/30/2025</a:t>
             </a:fld>
             <a:endParaRPr lang="en-US"/>
           </a:p>
@@ -898,7 +829,7 @@
             <a:fld id="{1D8BD707-D9CF-40AE-B4C6-C98DA3205C09}" type="datetimeFigureOut">
               <a:rPr lang="en-US" smtClean="0"/>
               <a:pPr/>
-              <a:t>6/27/2025</a:t>
+              <a:t>6/30/2025</a:t>
             </a:fld>
             <a:endParaRPr lang="en-US"/>
           </a:p>
@@ -1140,7 +1071,7 @@
             <a:fld id="{1D8BD707-D9CF-40AE-B4C6-C98DA3205C09}" type="datetimeFigureOut">
               <a:rPr lang="en-US" smtClean="0"/>
               <a:pPr/>
-              <a:t>6/27/2025</a:t>
+              <a:t>6/30/2025</a:t>
             </a:fld>
             <a:endParaRPr lang="en-US"/>
           </a:p>
@@ -1422,7 +1353,7 @@
             <a:fld id="{1D8BD707-D9CF-40AE-B4C6-C98DA3205C09}" type="datetimeFigureOut">
               <a:rPr lang="en-US" smtClean="0"/>
               <a:pPr/>
-              <a:t>6/27/2025</a:t>
+              <a:t>6/30/2025</a:t>
             </a:fld>
             <a:endParaRPr lang="en-US"/>
           </a:p>
@@ -1838,7 +1769,7 @@
             <a:fld id="{1D8BD707-D9CF-40AE-B4C6-C98DA3205C09}" type="datetimeFigureOut">
               <a:rPr lang="en-US" smtClean="0"/>
               <a:pPr/>
-              <a:t>6/27/2025</a:t>
+              <a:t>6/30/2025</a:t>
             </a:fld>
             <a:endParaRPr lang="en-US"/>
           </a:p>
@@ -1952,7 +1883,7 @@
             <a:fld id="{1D8BD707-D9CF-40AE-B4C6-C98DA3205C09}" type="datetimeFigureOut">
               <a:rPr lang="en-US" smtClean="0"/>
               <a:pPr/>
-              <a:t>6/27/2025</a:t>
+              <a:t>6/30/2025</a:t>
             </a:fld>
             <a:endParaRPr lang="en-US"/>
           </a:p>
@@ -2044,7 +1975,7 @@
             <a:fld id="{1D8BD707-D9CF-40AE-B4C6-C98DA3205C09}" type="datetimeFigureOut">
               <a:rPr lang="en-US" smtClean="0"/>
               <a:pPr/>
-              <a:t>6/27/2025</a:t>
+              <a:t>6/30/2025</a:t>
             </a:fld>
             <a:endParaRPr lang="en-US"/>
           </a:p>
@@ -2316,7 +2247,7 @@
             <a:fld id="{1D8BD707-D9CF-40AE-B4C6-C98DA3205C09}" type="datetimeFigureOut">
               <a:rPr lang="en-US" smtClean="0"/>
               <a:pPr/>
-              <a:t>6/27/2025</a:t>
+              <a:t>6/30/2025</a:t>
             </a:fld>
             <a:endParaRPr lang="en-US"/>
           </a:p>
@@ -2565,7 +2496,7 @@
             <a:fld id="{1D8BD707-D9CF-40AE-B4C6-C98DA3205C09}" type="datetimeFigureOut">
               <a:rPr lang="en-US" smtClean="0"/>
               <a:pPr/>
-              <a:t>6/27/2025</a:t>
+              <a:t>6/30/2025</a:t>
             </a:fld>
             <a:endParaRPr lang="en-US"/>
           </a:p>
@@ -2773,7 +2704,7 @@
             <a:fld id="{1D8BD707-D9CF-40AE-B4C6-C98DA3205C09}" type="datetimeFigureOut">
               <a:rPr lang="en-US" smtClean="0"/>
               <a:pPr/>
-              <a:t>6/27/2025</a:t>
+              <a:t>6/30/2025</a:t>
             </a:fld>
             <a:endParaRPr lang="en-US"/>
           </a:p>
@@ -6203,7 +6134,7 @@
                 <a:cs typeface="TT Hazelnuts"/>
                 <a:sym typeface="TT Hazelnuts"/>
               </a:rPr>
-              <a:t>Se resolvió nuevamente la ecuación de Van der Waals para el CO₂ a 200 K y una presión de 0.5 MPa utilizando exclusivamente los métodos desarrollados en el inciso anterior: el método de Taylor de segundo orden, y una versión combinada que inicia con bisección y continúa con Taylor. Se evaluaron diferentes condiciones iniciales y se compararon tiempos e iteraciones. El método combinado mostró mayor robustez, asegurando convergencia incluso en regiones donde Taylor puro fallaba. Este último fue más rápido cuando convergía, pero sensible a la elección de x0x_0x0​ y al valor de la segunda derivada. Ambos métodos proporcionaron un volumen real coherente, considerablemente superior al estimado por el modelo ideal.</a:t>
+              <a:t>Se resolvió nuevamente la ecuación de an der Waals para el CO₂ a 200 K y una presión de 0.5 MPa utilizando exclusivamente los métodos desarrollados en el inciso anterior: el método de Taylor de segundo orden, y una versión combinada que inicia con bisección y continúa con Taylor. Se evaluaron diferentes condiciones iniciales y se compararon tiempos e iteraciones. El método combinado mostró mayor robustez, asegurando convergencia incluso en regiones donde Taylor puro fallaba. Este último fue más rápido cuando convergía, pero sensible a la elección de x0​ y al valor de la segunda derivada. Ambos métodos proporcionaron un volumen real coherente, considerablemente superior al estimado por el modelo ideal.</a:t>
             </a:r>
           </a:p>
         </p:txBody>
@@ -6249,8 +6180,8 @@
         </p:nvSpPr>
         <p:spPr>
           <a:xfrm>
-            <a:off x="794178" y="1409700"/>
-            <a:ext cx="10864422" cy="5001369"/>
+            <a:off x="465363" y="1239619"/>
+            <a:ext cx="6324600" cy="6668492"/>
           </a:xfrm>
           <a:prstGeom prst="rect">
             <a:avLst/>
@@ -6346,7 +6277,7 @@
                 <a:spcPts val="13022"/>
               </a:lnSpc>
             </a:pPr>
-            <a:endParaRPr lang="en-US" sz="11732" b="1" dirty="0">
+            <a:endParaRPr lang="en-US" sz="11732" dirty="0">
               <a:solidFill>
                 <a:srgbClr val="000000"/>
               </a:solidFill>
@@ -6366,7 +6297,7 @@
         </p:nvSpPr>
         <p:spPr>
           <a:xfrm rot="-2871118">
-            <a:off x="732709" y="539375"/>
+            <a:off x="1248291" y="350450"/>
             <a:ext cx="1043920" cy="1158302"/>
           </a:xfrm>
           <a:custGeom>
@@ -6425,7 +6356,7 @@
         </p:nvSpPr>
         <p:spPr>
           <a:xfrm rot="-7146763">
-            <a:off x="9515234" y="3883193"/>
+            <a:off x="13166033" y="7577105"/>
             <a:ext cx="1781098" cy="1706615"/>
           </a:xfrm>
           <a:custGeom>
@@ -6472,7 +6403,7 @@
           <a:bodyPr/>
           <a:lstStyle/>
           <a:p>
-            <a:endParaRPr lang="es-AR"/>
+            <a:endParaRPr lang="es-AR" dirty="0"/>
           </a:p>
         </p:txBody>
       </p:sp>
@@ -6484,8 +6415,8 @@
         </p:nvSpPr>
         <p:spPr>
           <a:xfrm>
-            <a:off x="12000647" y="1409700"/>
-            <a:ext cx="5812334" cy="6400800"/>
+            <a:off x="4576082" y="6057900"/>
+            <a:ext cx="6477000" cy="3903881"/>
           </a:xfrm>
           <a:custGeom>
             <a:avLst/>
@@ -6525,16 +6456,16 @@
           <a:bodyPr/>
           <a:lstStyle/>
           <a:p>
-            <a:endParaRPr lang="es-AR"/>
+            <a:endParaRPr lang="es-AR" dirty="0"/>
           </a:p>
         </p:txBody>
       </p:sp>
       <p:pic>
         <p:nvPicPr>
-          <p:cNvPr id="6" name="Imagen 5">
+          <p:cNvPr id="7" name="Imagen 6" descr="Gráfico, Gráfico de líneas&#10;&#10;El contenido generado por IA puede ser incorrecto.">
             <a:extLst>
               <a:ext uri="{FF2B5EF4-FFF2-40B4-BE49-F238E27FC236}">
-                <a16:creationId xmlns:a16="http://schemas.microsoft.com/office/drawing/2014/main" id="{DBB9A16D-5E32-89BF-1D63-74080D9D2C2C}"/>
+                <a16:creationId xmlns:a16="http://schemas.microsoft.com/office/drawing/2014/main" id="{1ABA027B-4F94-2E1B-EAB5-91C15E10E270}"/>
               </a:ext>
             </a:extLst>
           </p:cNvPr>
@@ -6544,15 +6475,21 @@
           <p:nvPr/>
         </p:nvPicPr>
         <p:blipFill>
-          <a:blip r:embed="rId7"/>
+          <a:blip r:embed="rId7">
+            <a:extLst>
+              <a:ext uri="{28A0092B-C50C-407E-A947-70E740481C1C}">
+                <a14:useLocalDpi xmlns:a14="http://schemas.microsoft.com/office/drawing/2010/main" val="0"/>
+              </a:ext>
+            </a:extLst>
+          </a:blip>
           <a:stretch>
             <a:fillRect/>
           </a:stretch>
         </p:blipFill>
         <p:spPr>
           <a:xfrm>
-            <a:off x="1136225" y="4543077"/>
-            <a:ext cx="8016740" cy="4810044"/>
+            <a:off x="8839200" y="647700"/>
+            <a:ext cx="8508998" cy="5105400"/>
           </a:xfrm>
           <a:prstGeom prst="rect">
             <a:avLst/>

</xml_diff>